<commit_message>
Update Geo Query Builder Screenshot
</commit_message>
<xml_diff>
--- a/assets/Hackfest - FSDF Overview.pptx
+++ b/assets/Hackfest - FSDF Overview.pptx
@@ -26659,15 +26659,19 @@
           <a:p>
             <a:r>
               <a:rPr lang="en-AU" sz="1400" b="1" dirty="0" smtClean="0"/>
-              <a:t>Select </a:t>
-            </a:r>
-            <a:r>
-              <a:rPr lang="en-AU" sz="1400" b="1" dirty="0" smtClean="0"/>
               <a:t>Feature </a:t>
             </a:r>
             <a:r>
               <a:rPr lang="en-AU" sz="1400" dirty="0" smtClean="0"/>
-              <a:t>(e.g., Unit)</a:t>
+              <a:t>(e.g., </a:t>
+            </a:r>
+            <a:r>
+              <a:rPr lang="en-AU" sz="1400" dirty="0" err="1" smtClean="0"/>
+              <a:t>FSDF_Unit</a:t>
+            </a:r>
+            <a:r>
+              <a:rPr lang="en-AU" sz="1400" dirty="0" smtClean="0"/>
+              <a:t>)</a:t>
             </a:r>
             <a:endParaRPr lang="de-DE" sz="1400" dirty="0"/>
           </a:p>
@@ -26726,7 +26730,7 @@
             </a:r>
             <a:r>
               <a:rPr lang="en-AU" sz="1400" dirty="0" err="1" smtClean="0"/>
-              <a:t>unit_id</a:t>
+              <a:t>Unit_ID</a:t>
             </a:r>
             <a:r>
               <a:rPr lang="en-AU" sz="1400" dirty="0" smtClean="0"/>
@@ -26847,8 +26851,8 @@
         </p:nvSpPr>
         <p:spPr>
           <a:xfrm>
-            <a:off x="1835696" y="1988839"/>
-            <a:ext cx="5328592" cy="392415"/>
+            <a:off x="857915" y="1916833"/>
+            <a:ext cx="6306373" cy="392415"/>
           </a:xfrm>
           <a:prstGeom prst="rect">
             <a:avLst/>
@@ -26860,14 +26864,12 @@
           </a:bodyPr>
           <a:lstStyle/>
           <a:p>
-            <a:pPr algn="ctr"/>
             <a:endParaRPr lang="de-DE" sz="650" dirty="0">
               <a:latin typeface="Times New Roman" pitchFamily="18" charset="0"/>
               <a:cs typeface="Times New Roman" pitchFamily="18" charset="0"/>
             </a:endParaRPr>
           </a:p>
           <a:p>
-            <a:pPr algn="ctr"/>
             <a:r>
               <a:rPr lang="de-DE" sz="650" dirty="0">
                 <a:latin typeface="Times New Roman" pitchFamily="18" charset="0"/>
@@ -26919,7 +26921,6 @@
             </a:r>
           </a:p>
           <a:p>
-            <a:pPr algn="ctr"/>
             <a:r>
               <a:rPr lang="de-DE" sz="650" dirty="0" smtClean="0">
                 <a:latin typeface="Times New Roman" pitchFamily="18" charset="0"/>

</xml_diff>